<commit_message>
Updated the slide deck Added the MsConf demo to show all the pieces for ASP.NET 5
</commit_message>
<xml_diff>
--- a/slides/ASPNET5_Unleashed_DevIntersections_Fall2015.pptx
+++ b/slides/ASPNET5_Unleashed_DevIntersections_Fall2015.pptx
@@ -5,10 +5,10 @@
     <p:sldMasterId id="2147483648" r:id="rId4"/>
   </p:sldMasterIdLst>
   <p:notesMasterIdLst>
-    <p:notesMasterId r:id="rId31"/>
+    <p:notesMasterId r:id="rId33"/>
   </p:notesMasterIdLst>
   <p:handoutMasterIdLst>
-    <p:handoutMasterId r:id="rId32"/>
+    <p:handoutMasterId r:id="rId34"/>
   </p:handoutMasterIdLst>
   <p:sldIdLst>
     <p:sldId id="463" r:id="rId5"/>
@@ -16,27 +16,29 @@
     <p:sldId id="560" r:id="rId7"/>
     <p:sldId id="561" r:id="rId8"/>
     <p:sldId id="556" r:id="rId9"/>
-    <p:sldId id="557" r:id="rId10"/>
-    <p:sldId id="558" r:id="rId11"/>
-    <p:sldId id="562" r:id="rId12"/>
-    <p:sldId id="563" r:id="rId13"/>
-    <p:sldId id="564" r:id="rId14"/>
-    <p:sldId id="565" r:id="rId15"/>
-    <p:sldId id="566" r:id="rId16"/>
-    <p:sldId id="567" r:id="rId17"/>
-    <p:sldId id="568" r:id="rId18"/>
-    <p:sldId id="569" r:id="rId19"/>
-    <p:sldId id="570" r:id="rId20"/>
-    <p:sldId id="571" r:id="rId21"/>
-    <p:sldId id="572" r:id="rId22"/>
-    <p:sldId id="573" r:id="rId23"/>
-    <p:sldId id="574" r:id="rId24"/>
-    <p:sldId id="575" r:id="rId25"/>
-    <p:sldId id="576" r:id="rId26"/>
-    <p:sldId id="540" r:id="rId27"/>
-    <p:sldId id="577" r:id="rId28"/>
-    <p:sldId id="543" r:id="rId29"/>
-    <p:sldId id="546" r:id="rId30"/>
+    <p:sldId id="579" r:id="rId10"/>
+    <p:sldId id="578" r:id="rId11"/>
+    <p:sldId id="557" r:id="rId12"/>
+    <p:sldId id="558" r:id="rId13"/>
+    <p:sldId id="562" r:id="rId14"/>
+    <p:sldId id="563" r:id="rId15"/>
+    <p:sldId id="564" r:id="rId16"/>
+    <p:sldId id="565" r:id="rId17"/>
+    <p:sldId id="566" r:id="rId18"/>
+    <p:sldId id="567" r:id="rId19"/>
+    <p:sldId id="568" r:id="rId20"/>
+    <p:sldId id="569" r:id="rId21"/>
+    <p:sldId id="570" r:id="rId22"/>
+    <p:sldId id="571" r:id="rId23"/>
+    <p:sldId id="572" r:id="rId24"/>
+    <p:sldId id="573" r:id="rId25"/>
+    <p:sldId id="574" r:id="rId26"/>
+    <p:sldId id="575" r:id="rId27"/>
+    <p:sldId id="576" r:id="rId28"/>
+    <p:sldId id="540" r:id="rId29"/>
+    <p:sldId id="577" r:id="rId30"/>
+    <p:sldId id="543" r:id="rId31"/>
+    <p:sldId id="546" r:id="rId32"/>
   </p:sldIdLst>
   <p:sldSz cx="9144000" cy="6858000" type="screen4x3"/>
   <p:notesSz cx="7315200" cy="9601200"/>
@@ -175,6 +177,8 @@
             <p14:sldId id="560"/>
             <p14:sldId id="561"/>
             <p14:sldId id="556"/>
+            <p14:sldId id="579"/>
+            <p14:sldId id="578"/>
             <p14:sldId id="557"/>
             <p14:sldId id="558"/>
             <p14:sldId id="562"/>
@@ -3930,14 +3934,12 @@
               <a:rPr lang="en-US" dirty="0" smtClean="0"/>
               <a:t>Javier Lozano</a:t>
             </a:r>
-            <a:endParaRPr lang="en-US" dirty="0" smtClean="0"/>
           </a:p>
           <a:p>
             <a:r>
               <a:rPr lang="en-US" dirty="0" smtClean="0"/>
               <a:t>Javier@lozanotek.com</a:t>
             </a:r>
-            <a:endParaRPr lang="en-US" dirty="0" smtClean="0"/>
           </a:p>
         </p:txBody>
       </p:sp>
@@ -3955,7 +3957,7 @@
     <mc:Choice Requires="p14">
       <p:transition p14:dur="0"/>
     </mc:Choice>
-    <mc:Fallback xmlns="" xmlns:mv="urn:schemas-microsoft-com:mac:vml">
+    <mc:Fallback xmlns:mv="urn:schemas-microsoft-com:mac:vml" xmlns="">
       <mp:transition xmlns:mp="http://schemas.microsoft.com/office/mac/powerpoint/2008/main"/>
     </mc:Fallback>
   </mc:AlternateContent>
@@ -4003,11 +4005,19 @@
           <a:p>
             <a:r>
               <a:rPr lang="en-US" dirty="0" smtClean="0"/>
-              <a:t>Opt-in Approach</a:t>
+              <a:t>Why?</a:t>
             </a:r>
             <a:br>
               <a:rPr lang="en-US" dirty="0" smtClean="0"/>
             </a:br>
+            <a:r>
+              <a:rPr lang="en-US" sz="2400" dirty="0" smtClean="0">
+                <a:solidFill>
+                  <a:schemeClr val="accent1"/>
+                </a:solidFill>
+              </a:rPr>
+              <a:t>All this work for …</a:t>
+            </a:r>
             <a:endParaRPr lang="en-US" sz="2400" dirty="0">
               <a:solidFill>
                 <a:schemeClr val="accent1"/>
@@ -4032,53 +4042,29 @@
           <a:lstStyle/>
           <a:p>
             <a:r>
-              <a:rPr lang="en-US" dirty="0"/>
-              <a:t>Modularity First</a:t>
-            </a:r>
-          </a:p>
-          <a:p>
-            <a:r>
-              <a:rPr lang="en-US" dirty="0"/>
-              <a:t>Features are now packages</a:t>
-            </a:r>
-          </a:p>
-          <a:p>
-            <a:pPr lvl="1"/>
-            <a:r>
-              <a:rPr lang="en-US" dirty="0"/>
-              <a:t>Choose the components you want</a:t>
-            </a:r>
-          </a:p>
-          <a:p>
-            <a:r>
-              <a:rPr lang="en-US" dirty="0"/>
-              <a:t>Lighter Core Runtime</a:t>
-            </a:r>
-          </a:p>
-          <a:p>
-            <a:pPr lvl="1"/>
-            <a:r>
-              <a:rPr lang="en-US" dirty="0" err="1"/>
-              <a:t>HttpContext</a:t>
-            </a:r>
-            <a:r>
-              <a:rPr lang="en-US" dirty="0"/>
-              <a:t> is ~30K request (legacy</a:t>
-            </a:r>
-            <a:r>
-              <a:rPr lang="en-US" dirty="0" smtClean="0"/>
-              <a:t>)</a:t>
-            </a:r>
-          </a:p>
-          <a:p>
-            <a:pPr lvl="1"/>
-            <a:r>
-              <a:rPr lang="en-US" dirty="0" smtClean="0"/>
-              <a:t>~90% faster execution than current implementation</a:t>
-            </a:r>
-            <a:endParaRPr lang="en-US" dirty="0"/>
-          </a:p>
-          <a:p>
+              <a:rPr lang="en-US" dirty="0" smtClean="0"/>
+              <a:t>Cross Platform</a:t>
+            </a:r>
+          </a:p>
+          <a:p>
+            <a:r>
+              <a:rPr lang="en-US" dirty="0" smtClean="0"/>
+              <a:t>On-</a:t>
+            </a:r>
+            <a:r>
+              <a:rPr lang="en-US" dirty="0" err="1" smtClean="0"/>
+              <a:t>prem</a:t>
+            </a:r>
+            <a:r>
+              <a:rPr lang="en-US" dirty="0" smtClean="0"/>
+              <a:t> to Cloud</a:t>
+            </a:r>
+          </a:p>
+          <a:p>
+            <a:r>
+              <a:rPr lang="en-US" dirty="0" smtClean="0"/>
+              <a:t>Development Experience</a:t>
+            </a:r>
             <a:endParaRPr lang="en-US" dirty="0"/>
           </a:p>
         </p:txBody>
@@ -4086,7 +4072,7 @@
     </p:spTree>
     <p:extLst>
       <p:ext uri="{BB962C8B-B14F-4D97-AF65-F5344CB8AC3E}">
-        <p14:creationId xmlns:p14="http://schemas.microsoft.com/office/powerpoint/2010/main" val="1288716206"/>
+        <p14:creationId xmlns:p14="http://schemas.microsoft.com/office/powerpoint/2010/main" val="2397425477"/>
       </p:ext>
     </p:extLst>
   </p:cSld>
@@ -4140,7 +4126,15 @@
           <a:p>
             <a:r>
               <a:rPr lang="en-US" dirty="0" smtClean="0"/>
-              <a:t>Open Source</a:t>
+              <a:t>Fast(</a:t>
+            </a:r>
+            <a:r>
+              <a:rPr lang="en-US" dirty="0" err="1" smtClean="0"/>
+              <a:t>er</a:t>
+            </a:r>
+            <a:r>
+              <a:rPr lang="en-US" dirty="0" smtClean="0"/>
+              <a:t>) Development Cycle</a:t>
             </a:r>
             <a:br>
               <a:rPr lang="en-US" dirty="0" smtClean="0"/>
@@ -4170,49 +4164,64 @@
           <a:p>
             <a:r>
               <a:rPr lang="en-US" dirty="0"/>
-              <a:t>Released under MS Open Tech umbrella</a:t>
+              <a:t>Framework ships with application</a:t>
             </a:r>
           </a:p>
           <a:p>
             <a:pPr lvl="1"/>
             <a:r>
               <a:rPr lang="en-US" dirty="0"/>
-              <a:t>Subsidiary of MS Corp</a:t>
+              <a:t>Similar to mobile applications</a:t>
             </a:r>
           </a:p>
           <a:p>
             <a:r>
               <a:rPr lang="en-US" dirty="0"/>
-              <a:t>Hosted on </a:t>
+              <a:t>2 Framework Versions</a:t>
+            </a:r>
+          </a:p>
+          <a:p>
+            <a:pPr lvl="1"/>
+            <a:r>
+              <a:rPr lang="en-US" dirty="0"/>
+              <a:t>.NET </a:t>
             </a:r>
             <a:r>
               <a:rPr lang="en-US" dirty="0" err="1"/>
-              <a:t>Github</a:t>
-            </a:r>
-            <a:endParaRPr lang="en-US" dirty="0"/>
+              <a:t>vNext</a:t>
+            </a:r>
+            <a:r>
+              <a:rPr lang="en-US" dirty="0"/>
+              <a:t> – full</a:t>
+            </a:r>
           </a:p>
           <a:p>
             <a:pPr lvl="1"/>
             <a:r>
               <a:rPr lang="en-US" dirty="0"/>
-              <a:t>https://github.com/aspnet</a:t>
-            </a:r>
-          </a:p>
-          <a:p>
+              <a:t>.NET </a:t>
+            </a:r>
+            <a:r>
+              <a:rPr lang="en-US" dirty="0" smtClean="0"/>
+              <a:t>Core </a:t>
+            </a:r>
             <a:r>
               <a:rPr lang="en-US" dirty="0"/>
-              <a:t>Allows YOU to contribute</a:t>
-            </a:r>
-          </a:p>
-          <a:p>
-            <a:endParaRPr lang="en-US" dirty="0"/>
+              <a:t>– lighter</a:t>
+            </a:r>
+          </a:p>
+          <a:p>
+            <a:r>
+              <a:rPr lang="en-US" dirty="0"/>
+              <a:t>Break dependency on VS/Core schedules</a:t>
+            </a:r>
           </a:p>
         </p:txBody>
       </p:sp>
     </p:spTree>
     <p:extLst>
       <p:ext uri="{BB962C8B-B14F-4D97-AF65-F5344CB8AC3E}">
-        <p14:creationId xmlns:p14="http://schemas.microsoft.com/office/powerpoint/2010/main" val="830978689"/>
+        <p14:creationId xmlns:p14="http://schemas.microsoft.com/office/powerpoint/2010/main" val="3652661958"/>
       </p:ext>
     </p:extLst>
   </p:cSld>
@@ -4266,7 +4275,7 @@
           <a:p>
             <a:r>
               <a:rPr lang="en-US" dirty="0" smtClean="0"/>
-              <a:t>Cross Platform</a:t>
+              <a:t>Opt-in Approach</a:t>
             </a:r>
             <a:br>
               <a:rPr lang="en-US" dirty="0" smtClean="0"/>
@@ -4295,29 +4304,50 @@
           <a:lstStyle/>
           <a:p>
             <a:r>
-              <a:rPr lang="en-US" dirty="0" smtClean="0"/>
-              <a:t>Windows (.NET)</a:t>
-            </a:r>
-          </a:p>
-          <a:p>
-            <a:r>
-              <a:rPr lang="en-US" dirty="0" smtClean="0"/>
-              <a:t>OS X (Mono)</a:t>
-            </a:r>
-          </a:p>
-          <a:p>
-            <a:r>
-              <a:rPr lang="en-US" dirty="0" smtClean="0"/>
-              <a:t>Linux (Mono)</a:t>
-            </a:r>
-          </a:p>
-          <a:p>
-            <a:r>
-              <a:rPr lang="en-US" dirty="0" smtClean="0"/>
-              <a:t>?</a:t>
-            </a:r>
-          </a:p>
-          <a:p>
+              <a:rPr lang="en-US" dirty="0"/>
+              <a:t>Modularity First</a:t>
+            </a:r>
+          </a:p>
+          <a:p>
+            <a:r>
+              <a:rPr lang="en-US" dirty="0"/>
+              <a:t>Features are now packages</a:t>
+            </a:r>
+          </a:p>
+          <a:p>
+            <a:pPr lvl="1"/>
+            <a:r>
+              <a:rPr lang="en-US" dirty="0"/>
+              <a:t>Choose the components you want</a:t>
+            </a:r>
+          </a:p>
+          <a:p>
+            <a:r>
+              <a:rPr lang="en-US" dirty="0"/>
+              <a:t>Lighter Core Runtime</a:t>
+            </a:r>
+          </a:p>
+          <a:p>
+            <a:pPr lvl="1"/>
+            <a:r>
+              <a:rPr lang="en-US" dirty="0" err="1"/>
+              <a:t>HttpContext</a:t>
+            </a:r>
+            <a:r>
+              <a:rPr lang="en-US" dirty="0"/>
+              <a:t> is ~30K request (legacy</a:t>
+            </a:r>
+            <a:r>
+              <a:rPr lang="en-US" dirty="0" smtClean="0"/>
+              <a:t>)</a:t>
+            </a:r>
+          </a:p>
+          <a:p>
+            <a:pPr lvl="1"/>
+            <a:r>
+              <a:rPr lang="en-US" dirty="0" smtClean="0"/>
+              <a:t>~90% faster execution than current implementation</a:t>
+            </a:r>
             <a:endParaRPr lang="en-US" dirty="0"/>
           </a:p>
           <a:p>
@@ -4328,7 +4358,7 @@
     </p:spTree>
     <p:extLst>
       <p:ext uri="{BB962C8B-B14F-4D97-AF65-F5344CB8AC3E}">
-        <p14:creationId xmlns:p14="http://schemas.microsoft.com/office/powerpoint/2010/main" val="1530131437"/>
+        <p14:creationId xmlns:p14="http://schemas.microsoft.com/office/powerpoint/2010/main" val="1288716206"/>
       </p:ext>
     </p:extLst>
   </p:cSld>
@@ -4382,15 +4412,7 @@
           <a:p>
             <a:r>
               <a:rPr lang="en-US" dirty="0" smtClean="0"/>
-              <a:t>On-</a:t>
-            </a:r>
-            <a:r>
-              <a:rPr lang="en-US" dirty="0" err="1" smtClean="0"/>
-              <a:t>Prem</a:t>
-            </a:r>
-            <a:r>
-              <a:rPr lang="en-US" dirty="0" smtClean="0"/>
-              <a:t> to Cloud</a:t>
+              <a:t>Open Source</a:t>
             </a:r>
             <a:br>
               <a:rPr lang="en-US" dirty="0" smtClean="0"/>
@@ -4420,55 +4442,39 @@
           <a:p>
             <a:r>
               <a:rPr lang="en-US" dirty="0"/>
-              <a:t>Simpler Deployment</a:t>
+              <a:t>Released under MS Open Tech umbrella</a:t>
             </a:r>
           </a:p>
           <a:p>
             <a:pPr lvl="1"/>
             <a:r>
               <a:rPr lang="en-US" dirty="0"/>
-              <a:t>New runtime eliminates compilation step</a:t>
+              <a:t>Subsidiary of MS Corp</a:t>
             </a:r>
           </a:p>
           <a:p>
             <a:r>
               <a:rPr lang="en-US" dirty="0"/>
-              <a:t>Platform does the Lifting</a:t>
-            </a:r>
+              <a:t>Hosted on </a:t>
+            </a:r>
+            <a:r>
+              <a:rPr lang="en-US" dirty="0" err="1"/>
+              <a:t>Github</a:t>
+            </a:r>
+            <a:endParaRPr lang="en-US" dirty="0"/>
           </a:p>
           <a:p>
             <a:pPr lvl="1"/>
             <a:r>
               <a:rPr lang="en-US" dirty="0"/>
-              <a:t>Environment configures app by default</a:t>
+              <a:t>https://github.com/aspnet</a:t>
             </a:r>
           </a:p>
           <a:p>
             <a:r>
               <a:rPr lang="en-US" dirty="0"/>
-              <a:t>Loose Coupling</a:t>
-            </a:r>
-          </a:p>
-          <a:p>
-            <a:pPr lvl="1"/>
-            <a:r>
-              <a:rPr lang="en-US" dirty="0"/>
-              <a:t>Caching, Session, </a:t>
-            </a:r>
-            <a:r>
-              <a:rPr lang="en-US" dirty="0" smtClean="0"/>
-              <a:t>Metrics, etc</a:t>
-            </a:r>
-            <a:r>
-              <a:rPr lang="en-US" dirty="0"/>
-              <a:t>.</a:t>
-            </a:r>
-          </a:p>
-          <a:p>
-            <a:endParaRPr lang="en-US" dirty="0"/>
-          </a:p>
-          <a:p>
-            <a:endParaRPr lang="en-US" dirty="0"/>
+              <a:t>Allows YOU to contribute</a:t>
+            </a:r>
           </a:p>
           <a:p>
             <a:endParaRPr lang="en-US" dirty="0"/>
@@ -4478,7 +4484,7 @@
     </p:spTree>
     <p:extLst>
       <p:ext uri="{BB962C8B-B14F-4D97-AF65-F5344CB8AC3E}">
-        <p14:creationId xmlns:p14="http://schemas.microsoft.com/office/powerpoint/2010/main" val="2594036261"/>
+        <p14:creationId xmlns:p14="http://schemas.microsoft.com/office/powerpoint/2010/main" val="830978689"/>
       </p:ext>
     </p:extLst>
   </p:cSld>
@@ -4532,7 +4538,7 @@
           <a:p>
             <a:r>
               <a:rPr lang="en-US" dirty="0" smtClean="0"/>
-              <a:t>Development Experience</a:t>
+              <a:t>Cross Platform</a:t>
             </a:r>
             <a:br>
               <a:rPr lang="en-US" dirty="0" smtClean="0"/>
@@ -4561,53 +4567,27 @@
           <a:lstStyle/>
           <a:p>
             <a:r>
-              <a:rPr lang="en-US" dirty="0"/>
-              <a:t>Choose your own Editor</a:t>
-            </a:r>
-          </a:p>
-          <a:p>
-            <a:pPr lvl="1"/>
-            <a:r>
-              <a:rPr lang="en-US" dirty="0"/>
-              <a:t>Visual Studio, vim, Notepad++, ??</a:t>
-            </a:r>
-          </a:p>
-          <a:p>
-            <a:r>
-              <a:rPr lang="en-US" dirty="0"/>
-              <a:t>Opt-in to different runtime components</a:t>
-            </a:r>
-          </a:p>
-          <a:p>
-            <a:pPr lvl="1"/>
-            <a:r>
-              <a:rPr lang="en-US" dirty="0"/>
-              <a:t>Raw sockets to Managed Stack</a:t>
-            </a:r>
-          </a:p>
-          <a:p>
-            <a:r>
-              <a:rPr lang="en-US" dirty="0"/>
-              <a:t>Simpler Structure</a:t>
-            </a:r>
-          </a:p>
-          <a:p>
-            <a:pPr lvl="1"/>
-            <a:r>
-              <a:rPr lang="en-US" dirty="0" smtClean="0"/>
-              <a:t>Lighter </a:t>
-            </a:r>
-            <a:r>
-              <a:rPr lang="en-US" dirty="0"/>
-              <a:t>framework, projects, runtime, and dependencies</a:t>
-            </a:r>
-          </a:p>
-          <a:p>
-            <a:pPr lvl="1"/>
-            <a:endParaRPr lang="en-US" dirty="0"/>
-          </a:p>
-          <a:p>
-            <a:endParaRPr lang="en-US" dirty="0"/>
+              <a:rPr lang="en-US" dirty="0" smtClean="0"/>
+              <a:t>Windows (.NET)</a:t>
+            </a:r>
+          </a:p>
+          <a:p>
+            <a:r>
+              <a:rPr lang="en-US" dirty="0" smtClean="0"/>
+              <a:t>OS X (Mono)</a:t>
+            </a:r>
+          </a:p>
+          <a:p>
+            <a:r>
+              <a:rPr lang="en-US" dirty="0" smtClean="0"/>
+              <a:t>Linux (Mono)</a:t>
+            </a:r>
+          </a:p>
+          <a:p>
+            <a:r>
+              <a:rPr lang="en-US" dirty="0" smtClean="0"/>
+              <a:t>?</a:t>
+            </a:r>
           </a:p>
           <a:p>
             <a:endParaRPr lang="en-US" dirty="0"/>
@@ -4620,7 +4600,7 @@
     </p:spTree>
     <p:extLst>
       <p:ext uri="{BB962C8B-B14F-4D97-AF65-F5344CB8AC3E}">
-        <p14:creationId xmlns:p14="http://schemas.microsoft.com/office/powerpoint/2010/main" val="529991005"/>
+        <p14:creationId xmlns:p14="http://schemas.microsoft.com/office/powerpoint/2010/main" val="1530131437"/>
       </p:ext>
     </p:extLst>
   </p:cSld>
@@ -4674,23 +4654,19 @@
           <a:p>
             <a:r>
               <a:rPr lang="en-US" dirty="0" smtClean="0"/>
-              <a:t>Feature Overview</a:t>
-            </a:r>
-            <a:r>
-              <a:rPr lang="en-US" dirty="0" smtClean="0"/>
-              <a:t/>
+              <a:t>On-</a:t>
+            </a:r>
+            <a:r>
+              <a:rPr lang="en-US" dirty="0" err="1" smtClean="0"/>
+              <a:t>Prem</a:t>
+            </a:r>
+            <a:r>
+              <a:rPr lang="en-US" dirty="0" smtClean="0"/>
+              <a:t> to Cloud</a:t>
             </a:r>
             <a:br>
               <a:rPr lang="en-US" dirty="0" smtClean="0"/>
             </a:br>
-            <a:r>
-              <a:rPr lang="en-US" sz="2400" dirty="0" smtClean="0">
-                <a:solidFill>
-                  <a:schemeClr val="accent1"/>
-                </a:solidFill>
-              </a:rPr>
-              <a:t>Just to name a few …</a:t>
-            </a:r>
             <a:endParaRPr lang="en-US" sz="2400" dirty="0">
               <a:solidFill>
                 <a:schemeClr val="accent1"/>
@@ -4715,28 +4691,66 @@
           <a:lstStyle/>
           <a:p>
             <a:r>
-              <a:rPr lang="en-US" dirty="0" smtClean="0"/>
-              <a:t>Runtime</a:t>
-            </a:r>
-          </a:p>
-          <a:p>
-            <a:r>
-              <a:rPr lang="en-US" dirty="0" smtClean="0"/>
-              <a:t>Dependency Injection</a:t>
-            </a:r>
-          </a:p>
-          <a:p>
-            <a:r>
-              <a:rPr lang="en-US" dirty="0" smtClean="0"/>
-              <a:t>Diagnostics/Logging</a:t>
-            </a:r>
+              <a:rPr lang="en-US" dirty="0"/>
+              <a:t>Simpler Deployment</a:t>
+            </a:r>
+          </a:p>
+          <a:p>
+            <a:pPr lvl="1"/>
+            <a:r>
+              <a:rPr lang="en-US" dirty="0"/>
+              <a:t>New runtime eliminates compilation step</a:t>
+            </a:r>
+          </a:p>
+          <a:p>
+            <a:r>
+              <a:rPr lang="en-US" dirty="0"/>
+              <a:t>Platform does the Lifting</a:t>
+            </a:r>
+          </a:p>
+          <a:p>
+            <a:pPr lvl="1"/>
+            <a:r>
+              <a:rPr lang="en-US" dirty="0"/>
+              <a:t>Environment configures app by default</a:t>
+            </a:r>
+          </a:p>
+          <a:p>
+            <a:r>
+              <a:rPr lang="en-US" dirty="0"/>
+              <a:t>Loose Coupling</a:t>
+            </a:r>
+          </a:p>
+          <a:p>
+            <a:pPr lvl="1"/>
+            <a:r>
+              <a:rPr lang="en-US" dirty="0"/>
+              <a:t>Caching, Session, </a:t>
+            </a:r>
+            <a:r>
+              <a:rPr lang="en-US" dirty="0" smtClean="0"/>
+              <a:t>Metrics, etc</a:t>
+            </a:r>
+            <a:r>
+              <a:rPr lang="en-US" dirty="0"/>
+              <a:t>.</a:t>
+            </a:r>
+          </a:p>
+          <a:p>
+            <a:endParaRPr lang="en-US" dirty="0"/>
+          </a:p>
+          <a:p>
+            <a:endParaRPr lang="en-US" dirty="0"/>
+          </a:p>
+          <a:p>
+            <a:endParaRPr lang="en-US" dirty="0"/>
           </a:p>
         </p:txBody>
       </p:sp>
     </p:spTree>
     <p:extLst>
       <p:ext uri="{BB962C8B-B14F-4D97-AF65-F5344CB8AC3E}">
-        <p14:creationId xmlns:p14="http://schemas.microsoft.com/office/powerpoint/2010/main" val="3261146710"/>
+        <p14:creationId xmlns:p14="http://schemas.microsoft.com/office/powerpoint/2010/main" val="2594036261"/>
       </p:ext>
     </p:extLst>
   </p:cSld>
@@ -4790,23 +4804,11 @@
           <a:p>
             <a:r>
               <a:rPr lang="en-US" dirty="0" smtClean="0"/>
-              <a:t>Feature Overview</a:t>
-            </a:r>
-            <a:r>
-              <a:rPr lang="en-US" dirty="0" smtClean="0"/>
-              <a:t/>
+              <a:t>Development Experience</a:t>
             </a:r>
             <a:br>
               <a:rPr lang="en-US" dirty="0" smtClean="0"/>
             </a:br>
-            <a:r>
-              <a:rPr lang="en-US" sz="2400" dirty="0" smtClean="0">
-                <a:solidFill>
-                  <a:schemeClr val="accent1"/>
-                </a:solidFill>
-              </a:rPr>
-              <a:t>Just to name a few …</a:t>
-            </a:r>
             <a:endParaRPr lang="en-US" sz="2400" dirty="0">
               <a:solidFill>
                 <a:schemeClr val="accent1"/>
@@ -4831,28 +4833,66 @@
           <a:lstStyle/>
           <a:p>
             <a:r>
-              <a:rPr lang="en-US" dirty="0" smtClean="0"/>
-              <a:t>POCO Controllers</a:t>
-            </a:r>
-          </a:p>
-          <a:p>
-            <a:r>
-              <a:rPr lang="en-US" dirty="0" smtClean="0"/>
-              <a:t>Tag Helpers</a:t>
-            </a:r>
-          </a:p>
-          <a:p>
-            <a:r>
-              <a:rPr lang="en-US" dirty="0" smtClean="0"/>
-              <a:t>Custom Commands</a:t>
-            </a:r>
+              <a:rPr lang="en-US" dirty="0"/>
+              <a:t>Choose your own Editor</a:t>
+            </a:r>
+          </a:p>
+          <a:p>
+            <a:pPr lvl="1"/>
+            <a:r>
+              <a:rPr lang="en-US" dirty="0"/>
+              <a:t>Visual Studio, vim, Notepad++, ??</a:t>
+            </a:r>
+          </a:p>
+          <a:p>
+            <a:r>
+              <a:rPr lang="en-US" dirty="0"/>
+              <a:t>Opt-in to different runtime components</a:t>
+            </a:r>
+          </a:p>
+          <a:p>
+            <a:pPr lvl="1"/>
+            <a:r>
+              <a:rPr lang="en-US" dirty="0"/>
+              <a:t>Raw sockets to Managed Stack</a:t>
+            </a:r>
+          </a:p>
+          <a:p>
+            <a:r>
+              <a:rPr lang="en-US" dirty="0"/>
+              <a:t>Simpler Structure</a:t>
+            </a:r>
+          </a:p>
+          <a:p>
+            <a:pPr lvl="1"/>
+            <a:r>
+              <a:rPr lang="en-US" dirty="0" smtClean="0"/>
+              <a:t>Lighter </a:t>
+            </a:r>
+            <a:r>
+              <a:rPr lang="en-US" dirty="0"/>
+              <a:t>framework, projects, runtime, and dependencies</a:t>
+            </a:r>
+          </a:p>
+          <a:p>
+            <a:pPr lvl="1"/>
+            <a:endParaRPr lang="en-US" dirty="0"/>
+          </a:p>
+          <a:p>
+            <a:endParaRPr lang="en-US" dirty="0"/>
+          </a:p>
+          <a:p>
+            <a:endParaRPr lang="en-US" dirty="0"/>
+          </a:p>
+          <a:p>
+            <a:endParaRPr lang="en-US" dirty="0"/>
           </a:p>
         </p:txBody>
       </p:sp>
     </p:spTree>
     <p:extLst>
       <p:ext uri="{BB962C8B-B14F-4D97-AF65-F5344CB8AC3E}">
-        <p14:creationId xmlns:p14="http://schemas.microsoft.com/office/powerpoint/2010/main" val="3121703669"/>
+        <p14:creationId xmlns:p14="http://schemas.microsoft.com/office/powerpoint/2010/main" val="529991005"/>
       </p:ext>
     </p:extLst>
   </p:cSld>
@@ -4906,11 +4946,7 @@
           <a:p>
             <a:r>
               <a:rPr lang="en-US" dirty="0" smtClean="0"/>
-              <a:t>Runtime</a:t>
-            </a:r>
-            <a:r>
-              <a:rPr lang="en-US" dirty="0" smtClean="0"/>
-              <a:t/>
+              <a:t>Feature Overview</a:t>
             </a:r>
             <a:br>
               <a:rPr lang="en-US" dirty="0" smtClean="0"/>
@@ -4921,7 +4957,7 @@
                   <a:schemeClr val="accent1"/>
                 </a:solidFill>
               </a:rPr>
-              <a:t>The engine quietly humming…</a:t>
+              <a:t>Just to name a few …</a:t>
             </a:r>
             <a:endParaRPr lang="en-US" sz="2400" dirty="0">
               <a:solidFill>
@@ -4947,53 +4983,20 @@
           <a:lstStyle/>
           <a:p>
             <a:r>
-              <a:rPr lang="en-US" dirty="0"/>
-              <a:t>Quick development feedback</a:t>
-            </a:r>
-          </a:p>
-          <a:p>
-            <a:pPr lvl="1"/>
-            <a:r>
-              <a:rPr lang="en-US" dirty="0"/>
-              <a:t>Enable change and run</a:t>
-            </a:r>
-          </a:p>
-          <a:p>
-            <a:r>
-              <a:rPr lang="en-US" dirty="0"/>
-              <a:t>Remove </a:t>
-            </a:r>
-            <a:r>
-              <a:rPr lang="en-US" i="1" dirty="0"/>
-              <a:t>Design Time</a:t>
-            </a:r>
-          </a:p>
-          <a:p>
-            <a:pPr lvl="1"/>
-            <a:r>
-              <a:rPr lang="en-US" dirty="0"/>
-              <a:t>Everything is “as is”, allows for faster load times</a:t>
-            </a:r>
-          </a:p>
-          <a:p>
-            <a:r>
-              <a:rPr lang="en-US" dirty="0"/>
-              <a:t>No </a:t>
-            </a:r>
-            <a:r>
-              <a:rPr lang="en-US" i="1" dirty="0"/>
-              <a:t>compilation</a:t>
-            </a:r>
-            <a:r>
-              <a:rPr lang="en-US" dirty="0"/>
-              <a:t> step</a:t>
-            </a:r>
-          </a:p>
-          <a:p>
-            <a:pPr lvl="1"/>
-            <a:r>
-              <a:rPr lang="en-US" dirty="0"/>
-              <a:t>Disk I/O dependency is removed through caching</a:t>
+              <a:rPr lang="en-US" dirty="0" smtClean="0"/>
+              <a:t>Runtime</a:t>
+            </a:r>
+          </a:p>
+          <a:p>
+            <a:r>
+              <a:rPr lang="en-US" dirty="0" smtClean="0"/>
+              <a:t>Dependency Injection</a:t>
+            </a:r>
+          </a:p>
+          <a:p>
+            <a:r>
+              <a:rPr lang="en-US" dirty="0" smtClean="0"/>
+              <a:t>Diagnostics/Logging</a:t>
             </a:r>
           </a:p>
         </p:txBody>
@@ -5001,7 +5004,7 @@
     </p:spTree>
     <p:extLst>
       <p:ext uri="{BB962C8B-B14F-4D97-AF65-F5344CB8AC3E}">
-        <p14:creationId xmlns:p14="http://schemas.microsoft.com/office/powerpoint/2010/main" val="259513692"/>
+        <p14:creationId xmlns:p14="http://schemas.microsoft.com/office/powerpoint/2010/main" val="3261146710"/>
       </p:ext>
     </p:extLst>
   </p:cSld>
@@ -5055,11 +5058,7 @@
           <a:p>
             <a:r>
               <a:rPr lang="en-US" dirty="0" smtClean="0"/>
-              <a:t>Runtime</a:t>
-            </a:r>
-            <a:r>
-              <a:rPr lang="en-US" dirty="0" smtClean="0"/>
-              <a:t/>
+              <a:t>Feature Overview</a:t>
             </a:r>
             <a:br>
               <a:rPr lang="en-US" dirty="0" smtClean="0"/>
@@ -5070,7 +5069,7 @@
                   <a:schemeClr val="accent1"/>
                 </a:solidFill>
               </a:rPr>
-              <a:t>The engine quietly humming…</a:t>
+              <a:t>Just to name a few …</a:t>
             </a:r>
             <a:endParaRPr lang="en-US" sz="2400" dirty="0">
               <a:solidFill>
@@ -5096,48 +5095,20 @@
           <a:lstStyle/>
           <a:p>
             <a:r>
-              <a:rPr lang="en-US" dirty="0"/>
-              <a:t>Split into </a:t>
-            </a:r>
-            <a:r>
-              <a:rPr lang="en-US" dirty="0" smtClean="0"/>
-              <a:t>layers (onion or Ogre)</a:t>
-            </a:r>
-            <a:endParaRPr lang="en-US" dirty="0"/>
-          </a:p>
-          <a:p>
-            <a:pPr lvl="1"/>
-            <a:r>
-              <a:rPr lang="en-US" dirty="0"/>
-              <a:t>Layer 0: Native Process (native)</a:t>
-            </a:r>
-          </a:p>
-          <a:p>
-            <a:pPr lvl="1"/>
-            <a:r>
-              <a:rPr lang="en-US" dirty="0"/>
-              <a:t>Layer 1: CLR Host (native)</a:t>
-            </a:r>
-          </a:p>
-          <a:p>
-            <a:pPr lvl="1"/>
-            <a:r>
-              <a:rPr lang="en-US" dirty="0"/>
-              <a:t>Layer 2: Entry Point (managed)</a:t>
-            </a:r>
-          </a:p>
-          <a:p>
-            <a:pPr lvl="1"/>
-            <a:r>
-              <a:rPr lang="en-US" dirty="0"/>
-              <a:t>Layer 3: Application Host (managed)</a:t>
-            </a:r>
-          </a:p>
-          <a:p>
-            <a:pPr lvl="1"/>
-            <a:r>
-              <a:rPr lang="en-US" dirty="0"/>
-              <a:t>Layer 4: Application (managed)</a:t>
+              <a:rPr lang="en-US" dirty="0" smtClean="0"/>
+              <a:t>POCO Controllers</a:t>
+            </a:r>
+          </a:p>
+          <a:p>
+            <a:r>
+              <a:rPr lang="en-US" dirty="0" smtClean="0"/>
+              <a:t>Tag Helpers</a:t>
+            </a:r>
+          </a:p>
+          <a:p>
+            <a:r>
+              <a:rPr lang="en-US" dirty="0" smtClean="0"/>
+              <a:t>Custom Commands</a:t>
             </a:r>
           </a:p>
         </p:txBody>
@@ -5145,7 +5116,7 @@
     </p:spTree>
     <p:extLst>
       <p:ext uri="{BB962C8B-B14F-4D97-AF65-F5344CB8AC3E}">
-        <p14:creationId xmlns:p14="http://schemas.microsoft.com/office/powerpoint/2010/main" val="25821816"/>
+        <p14:creationId xmlns:p14="http://schemas.microsoft.com/office/powerpoint/2010/main" val="3121703669"/>
       </p:ext>
     </p:extLst>
   </p:cSld>
@@ -5201,10 +5172,6 @@
               <a:rPr lang="en-US" dirty="0" smtClean="0"/>
               <a:t>Runtime</a:t>
             </a:r>
-            <a:r>
-              <a:rPr lang="en-US" dirty="0" smtClean="0"/>
-              <a:t/>
-            </a:r>
             <a:br>
               <a:rPr lang="en-US" dirty="0" smtClean="0"/>
             </a:br>
@@ -5239,81 +5206,62 @@
           <a:bodyPr/>
           <a:lstStyle/>
           <a:p>
-            <a:pPr marL="0" indent="0">
-              <a:buNone/>
-            </a:pPr>
-            <a:endParaRPr lang="en-US" dirty="0"/>
-          </a:p>
-        </p:txBody>
-      </p:sp>
-      <p:pic>
-        <p:nvPicPr>
-          <p:cNvPr id="5" name="Picture 4"/>
-          <p:cNvPicPr>
-            <a:picLocks noChangeAspect="1"/>
-          </p:cNvPicPr>
-          <p:nvPr/>
-        </p:nvPicPr>
-        <p:blipFill>
-          <a:blip r:embed="rId2">
-            <a:extLst>
-              <a:ext uri="{28A0092B-C50C-407E-A947-70E740481C1C}">
-                <a14:useLocalDpi xmlns:a14="http://schemas.microsoft.com/office/drawing/2010/main" val="0"/>
-              </a:ext>
-            </a:extLst>
-          </a:blip>
-          <a:stretch>
-            <a:fillRect/>
-          </a:stretch>
-        </p:blipFill>
-        <p:spPr>
-          <a:xfrm>
-            <a:off x="990600" y="1576209"/>
-            <a:ext cx="7392601" cy="3535859"/>
-          </a:xfrm>
-          <a:prstGeom prst="rect">
-            <a:avLst/>
-          </a:prstGeom>
-        </p:spPr>
-      </p:pic>
-      <p:sp>
-        <p:nvSpPr>
-          <p:cNvPr id="7" name="TextBox 6"/>
-          <p:cNvSpPr txBox="1"/>
-          <p:nvPr/>
-        </p:nvSpPr>
-        <p:spPr>
-          <a:xfrm>
-            <a:off x="2868934" y="5416868"/>
-            <a:ext cx="3635932" cy="236219"/>
-          </a:xfrm>
-          <a:prstGeom prst="rect">
-            <a:avLst/>
-          </a:prstGeom>
-          <a:noFill/>
-        </p:spPr>
-        <p:txBody>
-          <a:bodyPr wrap="none" rtlCol="0">
-            <a:spAutoFit/>
-          </a:bodyPr>
-          <a:lstStyle/>
-          <a:p>
-            <a:r>
-              <a:rPr lang="en-US" sz="1100" b="1" i="1" dirty="0"/>
-              <a:t>https://</a:t>
-            </a:r>
-            <a:r>
-              <a:rPr lang="en-US" sz="1100" b="1" i="1" dirty="0" smtClean="0"/>
-              <a:t>github.com/aspnet/Home/wiki/DNX-structure</a:t>
-            </a:r>
-            <a:endParaRPr lang="en-US" sz="1100" b="1" i="1" dirty="0"/>
+            <a:r>
+              <a:rPr lang="en-US" dirty="0"/>
+              <a:t>Quick development feedback</a:t>
+            </a:r>
+          </a:p>
+          <a:p>
+            <a:pPr lvl="1"/>
+            <a:r>
+              <a:rPr lang="en-US" dirty="0"/>
+              <a:t>Enable change and run</a:t>
+            </a:r>
+          </a:p>
+          <a:p>
+            <a:r>
+              <a:rPr lang="en-US" dirty="0"/>
+              <a:t>Remove </a:t>
+            </a:r>
+            <a:r>
+              <a:rPr lang="en-US" i="1" dirty="0"/>
+              <a:t>Design Time</a:t>
+            </a:r>
+          </a:p>
+          <a:p>
+            <a:pPr lvl="1"/>
+            <a:r>
+              <a:rPr lang="en-US" dirty="0"/>
+              <a:t>Everything is “as is”, allows for faster load times</a:t>
+            </a:r>
+          </a:p>
+          <a:p>
+            <a:r>
+              <a:rPr lang="en-US" dirty="0"/>
+              <a:t>No </a:t>
+            </a:r>
+            <a:r>
+              <a:rPr lang="en-US" i="1" dirty="0"/>
+              <a:t>compilation</a:t>
+            </a:r>
+            <a:r>
+              <a:rPr lang="en-US" dirty="0"/>
+              <a:t> step</a:t>
+            </a:r>
+          </a:p>
+          <a:p>
+            <a:pPr lvl="1"/>
+            <a:r>
+              <a:rPr lang="en-US" dirty="0"/>
+              <a:t>Disk I/O dependency is removed through caching</a:t>
+            </a:r>
           </a:p>
         </p:txBody>
       </p:sp>
     </p:spTree>
     <p:extLst>
       <p:ext uri="{BB962C8B-B14F-4D97-AF65-F5344CB8AC3E}">
-        <p14:creationId xmlns:p14="http://schemas.microsoft.com/office/powerpoint/2010/main" val="1623564773"/>
+        <p14:creationId xmlns:p14="http://schemas.microsoft.com/office/powerpoint/2010/main" val="259513692"/>
       </p:ext>
     </p:extLst>
   </p:cSld>
@@ -5459,11 +5407,7 @@
           <a:p>
             <a:r>
               <a:rPr lang="en-US" dirty="0" smtClean="0"/>
-              <a:t>Dependency Injection</a:t>
-            </a:r>
-            <a:r>
-              <a:rPr lang="en-US" dirty="0" smtClean="0"/>
-              <a:t/>
+              <a:t>Runtime</a:t>
             </a:r>
             <a:br>
               <a:rPr lang="en-US" dirty="0" smtClean="0"/>
@@ -5474,15 +5418,7 @@
                   <a:schemeClr val="accent1"/>
                 </a:solidFill>
               </a:rPr>
-              <a:t>Building systems through composition</a:t>
-            </a:r>
-            <a:r>
-              <a:rPr lang="en-US" sz="2400" dirty="0" smtClean="0">
-                <a:solidFill>
-                  <a:schemeClr val="accent1"/>
-                </a:solidFill>
-              </a:rPr>
-              <a:t>…</a:t>
+              <a:t>The engine quietly humming…</a:t>
             </a:r>
             <a:endParaRPr lang="en-US" sz="2400" dirty="0">
               <a:solidFill>
@@ -5509,69 +5445,55 @@
           <a:p>
             <a:r>
               <a:rPr lang="en-US" dirty="0"/>
-              <a:t>DI abstractions shared across all the layers</a:t>
-            </a:r>
+              <a:t>Split into </a:t>
+            </a:r>
+            <a:r>
+              <a:rPr lang="en-US" dirty="0" smtClean="0"/>
+              <a:t>layers (onion or Ogre)</a:t>
+            </a:r>
+            <a:endParaRPr lang="en-US" dirty="0"/>
           </a:p>
           <a:p>
             <a:pPr lvl="1"/>
             <a:r>
               <a:rPr lang="en-US" dirty="0"/>
-              <a:t>ASP.NET</a:t>
+              <a:t>Layer 0: Native Process (native)</a:t>
             </a:r>
           </a:p>
           <a:p>
             <a:pPr lvl="1"/>
             <a:r>
               <a:rPr lang="en-US" dirty="0"/>
-              <a:t>EF7</a:t>
-            </a:r>
-          </a:p>
-          <a:p>
+              <a:t>Layer 1: CLR Host (native)</a:t>
+            </a:r>
+          </a:p>
+          <a:p>
+            <a:pPr lvl="1"/>
             <a:r>
               <a:rPr lang="en-US" dirty="0"/>
-              <a:t>Allows developer to pick your favorite DI container</a:t>
+              <a:t>Layer 2: Entry Point (managed)</a:t>
             </a:r>
           </a:p>
           <a:p>
             <a:pPr lvl="1"/>
             <a:r>
-              <a:rPr lang="en-US" dirty="0" err="1"/>
-              <a:t>Ninject</a:t>
-            </a:r>
-            <a:endParaRPr lang="en-US" dirty="0"/>
+              <a:rPr lang="en-US" dirty="0"/>
+              <a:t>Layer 3: Application Host (managed)</a:t>
+            </a:r>
           </a:p>
           <a:p>
             <a:pPr lvl="1"/>
             <a:r>
               <a:rPr lang="en-US" dirty="0"/>
-              <a:t>Windsor</a:t>
-            </a:r>
-          </a:p>
-          <a:p>
-            <a:pPr lvl="1"/>
-            <a:r>
-              <a:rPr lang="en-US" dirty="0" err="1" smtClean="0"/>
-              <a:t>StructureMap</a:t>
-            </a:r>
-            <a:endParaRPr lang="en-US" dirty="0" smtClean="0"/>
-          </a:p>
-          <a:p>
-            <a:pPr lvl="1"/>
-            <a:r>
-              <a:rPr lang="en-US" dirty="0" err="1" smtClean="0"/>
-              <a:t>Autofac</a:t>
-            </a:r>
-            <a:endParaRPr lang="en-US" dirty="0"/>
-          </a:p>
-          <a:p>
-            <a:endParaRPr lang="en-US" dirty="0"/>
+              <a:t>Layer 4: Application (managed)</a:t>
+            </a:r>
           </a:p>
         </p:txBody>
       </p:sp>
     </p:spTree>
     <p:extLst>
       <p:ext uri="{BB962C8B-B14F-4D97-AF65-F5344CB8AC3E}">
-        <p14:creationId xmlns:p14="http://schemas.microsoft.com/office/powerpoint/2010/main" val="1795931926"/>
+        <p14:creationId xmlns:p14="http://schemas.microsoft.com/office/powerpoint/2010/main" val="25821816"/>
       </p:ext>
     </p:extLst>
   </p:cSld>
@@ -5625,11 +5547,7 @@
           <a:p>
             <a:r>
               <a:rPr lang="en-US" dirty="0" smtClean="0"/>
-              <a:t>Dependency Injection</a:t>
-            </a:r>
-            <a:r>
-              <a:rPr lang="en-US" dirty="0" smtClean="0"/>
-              <a:t/>
+              <a:t>Runtime</a:t>
             </a:r>
             <a:br>
               <a:rPr lang="en-US" dirty="0" smtClean="0"/>
@@ -5640,15 +5558,7 @@
                   <a:schemeClr val="accent1"/>
                 </a:solidFill>
               </a:rPr>
-              <a:t>Building systems through composition</a:t>
-            </a:r>
-            <a:r>
-              <a:rPr lang="en-US" sz="2400" dirty="0" smtClean="0">
-                <a:solidFill>
-                  <a:schemeClr val="accent1"/>
-                </a:solidFill>
-              </a:rPr>
-              <a:t>…</a:t>
+              <a:t>The engine quietly humming…</a:t>
             </a:r>
             <a:endParaRPr lang="en-US" sz="2400" dirty="0">
               <a:solidFill>
@@ -5682,7 +5592,7 @@
       </p:sp>
       <p:pic>
         <p:nvPicPr>
-          <p:cNvPr id="5" name="Picture 4" descr="Screen Shot 2014-10-29 at 8.01.43 PM.png"/>
+          <p:cNvPr id="5" name="Picture 4"/>
           <p:cNvPicPr>
             <a:picLocks noChangeAspect="1"/>
           </p:cNvPicPr>
@@ -5702,8 +5612,8 @@
         </p:blipFill>
         <p:spPr>
           <a:xfrm>
-            <a:off x="696109" y="1600200"/>
-            <a:ext cx="7751781" cy="2925769"/>
+            <a:off x="990600" y="1576209"/>
+            <a:ext cx="7392601" cy="3535859"/>
           </a:xfrm>
           <a:prstGeom prst="rect">
             <a:avLst/>
@@ -5718,8 +5628,8 @@
         </p:nvSpPr>
         <p:spPr>
           <a:xfrm>
-            <a:off x="1007129" y="5384062"/>
-            <a:ext cx="7129739" cy="240450"/>
+            <a:off x="2868934" y="5416868"/>
+            <a:ext cx="3635932" cy="236219"/>
           </a:xfrm>
           <a:prstGeom prst="rect">
             <a:avLst/>
@@ -5734,23 +5644,20 @@
           <a:p>
             <a:r>
               <a:rPr lang="en-US" sz="1100" b="1" i="1" dirty="0"/>
-              <a:t>http://</a:t>
-            </a:r>
-            <a:r>
-              <a:rPr lang="en-US" sz="1100" b="1" i="1" dirty="0" err="1"/>
-              <a:t>aspnet.uservoice.com</a:t>
-            </a:r>
-            <a:r>
-              <a:rPr lang="en-US" sz="1100" b="1" i="1" dirty="0"/>
-              <a:t>/forums/41199-general-asp-net/suggestions/487734-put-ioc-front-and-centre</a:t>
-            </a:r>
+              <a:t>https://</a:t>
+            </a:r>
+            <a:r>
+              <a:rPr lang="en-US" sz="1100" b="1" i="1" dirty="0" smtClean="0"/>
+              <a:t>github.com/aspnet/Home/wiki/DNX-structure</a:t>
+            </a:r>
+            <a:endParaRPr lang="en-US" sz="1100" b="1" i="1" dirty="0"/>
           </a:p>
         </p:txBody>
       </p:sp>
     </p:spTree>
     <p:extLst>
       <p:ext uri="{BB962C8B-B14F-4D97-AF65-F5344CB8AC3E}">
-        <p14:creationId xmlns:p14="http://schemas.microsoft.com/office/powerpoint/2010/main" val="3439172730"/>
+        <p14:creationId xmlns:p14="http://schemas.microsoft.com/office/powerpoint/2010/main" val="1623564773"/>
       </p:ext>
     </p:extLst>
   </p:cSld>
@@ -5804,11 +5711,7 @@
           <a:p>
             <a:r>
               <a:rPr lang="en-US" dirty="0" smtClean="0"/>
-              <a:t>Diagnostics/Logging</a:t>
-            </a:r>
-            <a:r>
-              <a:rPr lang="en-US" dirty="0" smtClean="0"/>
-              <a:t/>
+              <a:t>Dependency Injection</a:t>
             </a:r>
             <a:br>
               <a:rPr lang="en-US" dirty="0" smtClean="0"/>
@@ -5819,7 +5722,7 @@
                   <a:schemeClr val="accent1"/>
                 </a:solidFill>
               </a:rPr>
-              <a:t>Peek through the stack…</a:t>
+              <a:t>Building systems through composition…</a:t>
             </a:r>
             <a:endParaRPr lang="en-US" sz="2400" dirty="0">
               <a:solidFill>
@@ -5846,38 +5749,61 @@
           <a:p>
             <a:r>
               <a:rPr lang="en-US" dirty="0"/>
-              <a:t>Basic logging abstractions</a:t>
-            </a:r>
-          </a:p>
-          <a:p>
+              <a:t>DI abstractions shared across all the layers</a:t>
+            </a:r>
+          </a:p>
+          <a:p>
+            <a:pPr lvl="1"/>
             <a:r>
               <a:rPr lang="en-US" dirty="0"/>
-              <a:t>Setup across all layers of the runtime/framework</a:t>
-            </a:r>
-          </a:p>
-          <a:p>
+              <a:t>ASP.NET</a:t>
+            </a:r>
+          </a:p>
+          <a:p>
+            <a:pPr lvl="1"/>
             <a:r>
               <a:rPr lang="en-US" dirty="0"/>
-              <a:t>Ships with </a:t>
-            </a:r>
+              <a:t>EF7</a:t>
+            </a:r>
+          </a:p>
+          <a:p>
+            <a:r>
+              <a:rPr lang="en-US" dirty="0"/>
+              <a:t>Allows developer to pick your favorite DI container</a:t>
+            </a:r>
+          </a:p>
+          <a:p>
+            <a:pPr lvl="1"/>
+            <a:r>
+              <a:rPr lang="en-US" dirty="0" err="1"/>
+              <a:t>Ninject</a:t>
+            </a:r>
+            <a:endParaRPr lang="en-US" dirty="0"/>
+          </a:p>
+          <a:p>
+            <a:pPr lvl="1"/>
+            <a:r>
+              <a:rPr lang="en-US" dirty="0"/>
+              <a:t>Windsor</a:t>
+            </a:r>
+          </a:p>
+          <a:p>
+            <a:pPr lvl="1"/>
             <a:r>
               <a:rPr lang="en-US" dirty="0" err="1" smtClean="0"/>
-              <a:t>NLog</a:t>
+              <a:t>StructureMap</a:t>
             </a:r>
             <a:endParaRPr lang="en-US" dirty="0" smtClean="0"/>
           </a:p>
           <a:p>
             <a:pPr lvl="1"/>
             <a:r>
-              <a:rPr lang="en-US" dirty="0" smtClean="0"/>
-              <a:t>Can add your own favorite logging framework</a:t>
+              <a:rPr lang="en-US" dirty="0" err="1" smtClean="0"/>
+              <a:t>Autofac</a:t>
             </a:r>
             <a:endParaRPr lang="en-US" dirty="0"/>
           </a:p>
           <a:p>
-            <a:pPr marL="0" indent="0">
-              <a:buNone/>
-            </a:pPr>
             <a:endParaRPr lang="en-US" dirty="0"/>
           </a:p>
         </p:txBody>
@@ -5885,7 +5811,7 @@
     </p:spTree>
     <p:extLst>
       <p:ext uri="{BB962C8B-B14F-4D97-AF65-F5344CB8AC3E}">
-        <p14:creationId xmlns:p14="http://schemas.microsoft.com/office/powerpoint/2010/main" val="2001352890"/>
+        <p14:creationId xmlns:p14="http://schemas.microsoft.com/office/powerpoint/2010/main" val="1795931926"/>
       </p:ext>
     </p:extLst>
   </p:cSld>
@@ -5924,38 +5850,7 @@
       </p:grpSpPr>
       <p:sp>
         <p:nvSpPr>
-          <p:cNvPr id="5" name="Text Placeholder 4"/>
-          <p:cNvSpPr>
-            <a:spLocks noGrp="1"/>
-          </p:cNvSpPr>
-          <p:nvPr>
-            <p:ph type="body" idx="4294967295"/>
-          </p:nvPr>
-        </p:nvSpPr>
-        <p:spPr>
-          <a:xfrm>
-            <a:off x="457200" y="4114800"/>
-            <a:ext cx="8229600" cy="1752600"/>
-          </a:xfrm>
-        </p:spPr>
-        <p:txBody>
-          <a:bodyPr/>
-          <a:lstStyle/>
-          <a:p>
-            <a:pPr marL="0" indent="0">
-              <a:buNone/>
-            </a:pPr>
-            <a:r>
-              <a:rPr lang="en-US" dirty="0" smtClean="0"/>
-              <a:t>Enough slides, let’s code!</a:t>
-            </a:r>
-            <a:endParaRPr lang="en-US" dirty="0" smtClean="0"/>
-          </a:p>
-        </p:txBody>
-      </p:sp>
-      <p:sp>
-        <p:nvSpPr>
-          <p:cNvPr id="6" name="Title 5"/>
+          <p:cNvPr id="4" name="Title 1"/>
           <p:cNvSpPr>
             <a:spLocks noGrp="1"/>
           </p:cNvSpPr>
@@ -5968,14 +5863,122 @@
           <a:bodyPr/>
           <a:lstStyle/>
           <a:p>
+            <a:r>
+              <a:rPr lang="en-US" dirty="0" smtClean="0"/>
+              <a:t>Dependency Injection</a:t>
+            </a:r>
+            <a:br>
+              <a:rPr lang="en-US" dirty="0" smtClean="0"/>
+            </a:br>
+            <a:r>
+              <a:rPr lang="en-US" sz="2400" dirty="0" smtClean="0">
+                <a:solidFill>
+                  <a:schemeClr val="accent1"/>
+                </a:solidFill>
+              </a:rPr>
+              <a:t>Building systems through composition…</a:t>
+            </a:r>
+            <a:endParaRPr lang="en-US" sz="2400" dirty="0">
+              <a:solidFill>
+                <a:schemeClr val="accent1"/>
+              </a:solidFill>
+            </a:endParaRPr>
+          </a:p>
+        </p:txBody>
+      </p:sp>
+      <p:sp>
+        <p:nvSpPr>
+          <p:cNvPr id="6" name="Text Placeholder 5"/>
+          <p:cNvSpPr>
+            <a:spLocks noGrp="1"/>
+          </p:cNvSpPr>
+          <p:nvPr>
+            <p:ph type="body" idx="1"/>
+          </p:nvPr>
+        </p:nvSpPr>
+        <p:spPr/>
+        <p:txBody>
+          <a:bodyPr/>
+          <a:lstStyle/>
+          <a:p>
+            <a:pPr marL="0" indent="0">
+              <a:buNone/>
+            </a:pPr>
             <a:endParaRPr lang="en-US" dirty="0"/>
+          </a:p>
+        </p:txBody>
+      </p:sp>
+      <p:pic>
+        <p:nvPicPr>
+          <p:cNvPr id="5" name="Picture 4" descr="Screen Shot 2014-10-29 at 8.01.43 PM.png"/>
+          <p:cNvPicPr>
+            <a:picLocks noChangeAspect="1"/>
+          </p:cNvPicPr>
+          <p:nvPr/>
+        </p:nvPicPr>
+        <p:blipFill>
+          <a:blip r:embed="rId2">
+            <a:extLst>
+              <a:ext uri="{28A0092B-C50C-407E-A947-70E740481C1C}">
+                <a14:useLocalDpi xmlns:a14="http://schemas.microsoft.com/office/drawing/2010/main" val="0"/>
+              </a:ext>
+            </a:extLst>
+          </a:blip>
+          <a:stretch>
+            <a:fillRect/>
+          </a:stretch>
+        </p:blipFill>
+        <p:spPr>
+          <a:xfrm>
+            <a:off x="696109" y="1600200"/>
+            <a:ext cx="7751781" cy="2925769"/>
+          </a:xfrm>
+          <a:prstGeom prst="rect">
+            <a:avLst/>
+          </a:prstGeom>
+        </p:spPr>
+      </p:pic>
+      <p:sp>
+        <p:nvSpPr>
+          <p:cNvPr id="7" name="TextBox 6"/>
+          <p:cNvSpPr txBox="1"/>
+          <p:nvPr/>
+        </p:nvSpPr>
+        <p:spPr>
+          <a:xfrm>
+            <a:off x="1007129" y="5384062"/>
+            <a:ext cx="7129739" cy="240450"/>
+          </a:xfrm>
+          <a:prstGeom prst="rect">
+            <a:avLst/>
+          </a:prstGeom>
+          <a:noFill/>
+        </p:spPr>
+        <p:txBody>
+          <a:bodyPr wrap="none" rtlCol="0">
+            <a:spAutoFit/>
+          </a:bodyPr>
+          <a:lstStyle/>
+          <a:p>
+            <a:r>
+              <a:rPr lang="en-US" sz="1100" b="1" i="1" dirty="0"/>
+              <a:t>http://</a:t>
+            </a:r>
+            <a:r>
+              <a:rPr lang="en-US" sz="1100" b="1" i="1" dirty="0" err="1"/>
+              <a:t>aspnet.uservoice.com</a:t>
+            </a:r>
+            <a:r>
+              <a:rPr lang="en-US" sz="1100" b="1" i="1" dirty="0"/>
+              <a:t>/forums/41199-general-asp-net/suggestions/487734-put-ioc-front-and-centre</a:t>
+            </a:r>
           </a:p>
         </p:txBody>
       </p:sp>
     </p:spTree>
     <p:extLst>
       <p:ext uri="{BB962C8B-B14F-4D97-AF65-F5344CB8AC3E}">
-        <p14:creationId xmlns:p14="http://schemas.microsoft.com/office/powerpoint/2010/main" val="188477453"/>
+        <p14:creationId xmlns:p14="http://schemas.microsoft.com/office/powerpoint/2010/main" val="3439172730"/>
       </p:ext>
     </p:extLst>
   </p:cSld>
@@ -6014,7 +6017,7 @@
       </p:grpSpPr>
       <p:sp>
         <p:nvSpPr>
-          <p:cNvPr id="2" name="Title 1"/>
+          <p:cNvPr id="4" name="Title 1"/>
           <p:cNvSpPr>
             <a:spLocks noGrp="1"/>
           </p:cNvSpPr>
@@ -6029,15 +6032,30 @@
           <a:p>
             <a:r>
               <a:rPr lang="en-US" dirty="0" smtClean="0"/>
-              <a:t>Review</a:t>
-            </a:r>
-            <a:endParaRPr lang="en-US" dirty="0"/>
+              <a:t>Diagnostics/Logging</a:t>
+            </a:r>
+            <a:br>
+              <a:rPr lang="en-US" dirty="0" smtClean="0"/>
+            </a:br>
+            <a:r>
+              <a:rPr lang="en-US" sz="2400" dirty="0" smtClean="0">
+                <a:solidFill>
+                  <a:schemeClr val="accent1"/>
+                </a:solidFill>
+              </a:rPr>
+              <a:t>Peek through the stack…</a:t>
+            </a:r>
+            <a:endParaRPr lang="en-US" sz="2400" dirty="0">
+              <a:solidFill>
+                <a:schemeClr val="accent1"/>
+              </a:solidFill>
+            </a:endParaRPr>
           </a:p>
         </p:txBody>
       </p:sp>
       <p:sp>
         <p:nvSpPr>
-          <p:cNvPr id="3" name="Text Placeholder 2"/>
+          <p:cNvPr id="6" name="Text Placeholder 5"/>
           <p:cNvSpPr>
             <a:spLocks noGrp="1"/>
           </p:cNvSpPr>
@@ -6051,55 +6069,31 @@
           <a:lstStyle/>
           <a:p>
             <a:r>
-              <a:rPr lang="en-US" dirty="0" smtClean="0"/>
-              <a:t>History</a:t>
-            </a:r>
-          </a:p>
-          <a:p>
-            <a:pPr lvl="1"/>
-            <a:r>
-              <a:rPr lang="en-US" dirty="0" smtClean="0"/>
-              <a:t>Bigger revamp than ASP -&gt; ASP.NET</a:t>
-            </a:r>
-          </a:p>
-          <a:p>
-            <a:pPr lvl="1"/>
-            <a:r>
-              <a:rPr lang="en-US" dirty="0" smtClean="0"/>
-              <a:t>Allow for legacy applications to continue as is</a:t>
+              <a:rPr lang="en-US" dirty="0"/>
+              <a:t>Basic logging abstractions</a:t>
+            </a:r>
+          </a:p>
+          <a:p>
+            <a:r>
+              <a:rPr lang="en-US" dirty="0"/>
+              <a:t>Setup across all layers of the runtime/framework</a:t>
+            </a:r>
+          </a:p>
+          <a:p>
+            <a:r>
+              <a:rPr lang="en-US" dirty="0" smtClean="0"/>
+              <a:t>Can </a:t>
+            </a:r>
+            <a:r>
+              <a:rPr lang="en-US" dirty="0" smtClean="0"/>
+              <a:t>add your own favorite logging framework</a:t>
             </a:r>
             <a:endParaRPr lang="en-US" dirty="0"/>
           </a:p>
           <a:p>
-            <a:r>
-              <a:rPr lang="en-US" dirty="0"/>
-              <a:t>Why</a:t>
-            </a:r>
-            <a:r>
-              <a:rPr lang="en-US" dirty="0" smtClean="0"/>
-              <a:t>?</a:t>
-            </a:r>
-          </a:p>
-          <a:p>
-            <a:pPr lvl="1"/>
-            <a:r>
-              <a:rPr lang="en-US" dirty="0" smtClean="0"/>
-              <a:t>Need to compete in a cloud first, mobile first world</a:t>
-            </a:r>
-          </a:p>
-          <a:p>
-            <a:pPr lvl="1"/>
-            <a:r>
-              <a:rPr lang="en-US" dirty="0" smtClean="0"/>
-              <a:t>Software is becoming more commoditized</a:t>
-            </a:r>
-          </a:p>
-          <a:p>
-            <a:pPr lvl="1"/>
-            <a:r>
-              <a:rPr lang="en-US" dirty="0" smtClean="0"/>
-              <a:t>We can’t predict the future</a:t>
-            </a:r>
+            <a:pPr marL="0" indent="0">
+              <a:buNone/>
+            </a:pPr>
             <a:endParaRPr lang="en-US" dirty="0"/>
           </a:p>
         </p:txBody>
@@ -6107,7 +6101,7 @@
     </p:spTree>
     <p:extLst>
       <p:ext uri="{BB962C8B-B14F-4D97-AF65-F5344CB8AC3E}">
-        <p14:creationId xmlns:p14="http://schemas.microsoft.com/office/powerpoint/2010/main" val="3513001876"/>
+        <p14:creationId xmlns:p14="http://schemas.microsoft.com/office/powerpoint/2010/main" val="2001352890"/>
       </p:ext>
     </p:extLst>
   </p:cSld>
@@ -6146,6 +6140,227 @@
       </p:grpSpPr>
       <p:sp>
         <p:nvSpPr>
+          <p:cNvPr id="5" name="Text Placeholder 4"/>
+          <p:cNvSpPr>
+            <a:spLocks noGrp="1"/>
+          </p:cNvSpPr>
+          <p:nvPr>
+            <p:ph type="body" idx="4294967295"/>
+          </p:nvPr>
+        </p:nvSpPr>
+        <p:spPr>
+          <a:xfrm>
+            <a:off x="457200" y="4114800"/>
+            <a:ext cx="8229600" cy="1752600"/>
+          </a:xfrm>
+        </p:spPr>
+        <p:txBody>
+          <a:bodyPr/>
+          <a:lstStyle/>
+          <a:p>
+            <a:pPr marL="0" indent="0">
+              <a:buNone/>
+            </a:pPr>
+            <a:r>
+              <a:rPr lang="en-US" dirty="0" smtClean="0"/>
+              <a:t>Enough slides, let’s code!</a:t>
+            </a:r>
+          </a:p>
+        </p:txBody>
+      </p:sp>
+      <p:sp>
+        <p:nvSpPr>
+          <p:cNvPr id="6" name="Title 5"/>
+          <p:cNvSpPr>
+            <a:spLocks noGrp="1"/>
+          </p:cNvSpPr>
+          <p:nvPr>
+            <p:ph type="title"/>
+          </p:nvPr>
+        </p:nvSpPr>
+        <p:spPr/>
+        <p:txBody>
+          <a:bodyPr/>
+          <a:lstStyle/>
+          <a:p>
+            <a:endParaRPr lang="en-US" dirty="0"/>
+          </a:p>
+        </p:txBody>
+      </p:sp>
+    </p:spTree>
+    <p:extLst>
+      <p:ext uri="{BB962C8B-B14F-4D97-AF65-F5344CB8AC3E}">
+        <p14:creationId xmlns:p14="http://schemas.microsoft.com/office/powerpoint/2010/main" val="188477453"/>
+      </p:ext>
+    </p:extLst>
+  </p:cSld>
+  <p:clrMapOvr>
+    <a:masterClrMapping/>
+  </p:clrMapOvr>
+  <p:transition>
+    <p:fade/>
+  </p:transition>
+  <p:timing>
+    <p:tnLst>
+      <p:par>
+        <p:cTn id="1" dur="indefinite" restart="never" nodeType="tmRoot"/>
+      </p:par>
+    </p:tnLst>
+  </p:timing>
+</p:sld>
+</file>
+
+<file path=ppt/slides/slide26.xml><?xml version="1.0" encoding="utf-8"?>
+<p:sld xmlns:a="http://schemas.openxmlformats.org/drawingml/2006/main" xmlns:r="http://schemas.openxmlformats.org/officeDocument/2006/relationships" xmlns:p="http://schemas.openxmlformats.org/presentationml/2006/main">
+  <p:cSld>
+    <p:spTree>
+      <p:nvGrpSpPr>
+        <p:cNvPr id="1" name=""/>
+        <p:cNvGrpSpPr/>
+        <p:nvPr/>
+      </p:nvGrpSpPr>
+      <p:grpSpPr>
+        <a:xfrm>
+          <a:off x="0" y="0"/>
+          <a:ext cx="0" cy="0"/>
+          <a:chOff x="0" y="0"/>
+          <a:chExt cx="0" cy="0"/>
+        </a:xfrm>
+      </p:grpSpPr>
+      <p:sp>
+        <p:nvSpPr>
+          <p:cNvPr id="2" name="Title 1"/>
+          <p:cNvSpPr>
+            <a:spLocks noGrp="1"/>
+          </p:cNvSpPr>
+          <p:nvPr>
+            <p:ph type="title"/>
+          </p:nvPr>
+        </p:nvSpPr>
+        <p:spPr/>
+        <p:txBody>
+          <a:bodyPr/>
+          <a:lstStyle/>
+          <a:p>
+            <a:r>
+              <a:rPr lang="en-US" dirty="0" smtClean="0"/>
+              <a:t>Review</a:t>
+            </a:r>
+            <a:endParaRPr lang="en-US" dirty="0"/>
+          </a:p>
+        </p:txBody>
+      </p:sp>
+      <p:sp>
+        <p:nvSpPr>
+          <p:cNvPr id="3" name="Text Placeholder 2"/>
+          <p:cNvSpPr>
+            <a:spLocks noGrp="1"/>
+          </p:cNvSpPr>
+          <p:nvPr>
+            <p:ph type="body" idx="1"/>
+          </p:nvPr>
+        </p:nvSpPr>
+        <p:spPr/>
+        <p:txBody>
+          <a:bodyPr/>
+          <a:lstStyle/>
+          <a:p>
+            <a:r>
+              <a:rPr lang="en-US" dirty="0" smtClean="0"/>
+              <a:t>History</a:t>
+            </a:r>
+          </a:p>
+          <a:p>
+            <a:pPr lvl="1"/>
+            <a:r>
+              <a:rPr lang="en-US" dirty="0" smtClean="0"/>
+              <a:t>Bigger revamp than ASP -&gt; ASP.NET</a:t>
+            </a:r>
+          </a:p>
+          <a:p>
+            <a:pPr lvl="1"/>
+            <a:r>
+              <a:rPr lang="en-US" dirty="0" smtClean="0"/>
+              <a:t>Allow for legacy applications to continue as is</a:t>
+            </a:r>
+            <a:endParaRPr lang="en-US" dirty="0"/>
+          </a:p>
+          <a:p>
+            <a:r>
+              <a:rPr lang="en-US" dirty="0"/>
+              <a:t>Why</a:t>
+            </a:r>
+            <a:r>
+              <a:rPr lang="en-US" dirty="0" smtClean="0"/>
+              <a:t>?</a:t>
+            </a:r>
+          </a:p>
+          <a:p>
+            <a:pPr lvl="1"/>
+            <a:r>
+              <a:rPr lang="en-US" dirty="0" smtClean="0"/>
+              <a:t>Need to compete in a cloud first, mobile first world</a:t>
+            </a:r>
+          </a:p>
+          <a:p>
+            <a:pPr lvl="1"/>
+            <a:r>
+              <a:rPr lang="en-US" dirty="0" smtClean="0"/>
+              <a:t>Software is becoming more commoditized</a:t>
+            </a:r>
+          </a:p>
+          <a:p>
+            <a:pPr lvl="1"/>
+            <a:r>
+              <a:rPr lang="en-US" dirty="0" smtClean="0"/>
+              <a:t>We can’t predict the future</a:t>
+            </a:r>
+            <a:endParaRPr lang="en-US" dirty="0"/>
+          </a:p>
+        </p:txBody>
+      </p:sp>
+    </p:spTree>
+    <p:extLst>
+      <p:ext uri="{BB962C8B-B14F-4D97-AF65-F5344CB8AC3E}">
+        <p14:creationId xmlns:p14="http://schemas.microsoft.com/office/powerpoint/2010/main" val="3513001876"/>
+      </p:ext>
+    </p:extLst>
+  </p:cSld>
+  <p:clrMapOvr>
+    <a:masterClrMapping/>
+  </p:clrMapOvr>
+  <p:transition>
+    <p:fade/>
+  </p:transition>
+  <p:timing>
+    <p:tnLst>
+      <p:par>
+        <p:cTn id="1" dur="indefinite" restart="never" nodeType="tmRoot"/>
+      </p:par>
+    </p:tnLst>
+  </p:timing>
+</p:sld>
+</file>
+
+<file path=ppt/slides/slide27.xml><?xml version="1.0" encoding="utf-8"?>
+<p:sld xmlns:a="http://schemas.openxmlformats.org/drawingml/2006/main" xmlns:r="http://schemas.openxmlformats.org/officeDocument/2006/relationships" xmlns:p="http://schemas.openxmlformats.org/presentationml/2006/main">
+  <p:cSld>
+    <p:spTree>
+      <p:nvGrpSpPr>
+        <p:cNvPr id="1" name=""/>
+        <p:cNvGrpSpPr/>
+        <p:nvPr/>
+      </p:nvGrpSpPr>
+      <p:grpSpPr>
+        <a:xfrm>
+          <a:off x="0" y="0"/>
+          <a:ext cx="0" cy="0"/>
+          <a:chOff x="0" y="0"/>
+          <a:chExt cx="0" cy="0"/>
+        </a:xfrm>
+      </p:grpSpPr>
+      <p:sp>
+        <p:nvSpPr>
           <p:cNvPr id="2" name="Title 1"/>
           <p:cNvSpPr>
             <a:spLocks noGrp="1"/>
@@ -6248,7 +6463,7 @@
 </p:sld>
 </file>
 
-<file path=ppt/slides/slide26.xml><?xml version="1.0" encoding="utf-8"?>
+<file path=ppt/slides/slide28.xml><?xml version="1.0" encoding="utf-8"?>
 <p:sld xmlns:a="http://schemas.openxmlformats.org/drawingml/2006/main" xmlns:r="http://schemas.openxmlformats.org/officeDocument/2006/relationships" xmlns:p="http://schemas.openxmlformats.org/presentationml/2006/main">
   <p:cSld>
     <p:spTree>
@@ -6925,7 +7140,7 @@
           <a:p>
             <a:r>
               <a:rPr lang="en-US" dirty="0" smtClean="0"/>
-              <a:t>History</a:t>
+              <a:t>CAVEAT</a:t>
             </a:r>
             <a:r>
               <a:rPr lang="en-US" dirty="0" smtClean="0"/>
@@ -6940,7 +7155,7 @@
                   <a:schemeClr val="accent1"/>
                 </a:solidFill>
               </a:rPr>
-              <a:t>Where are we now?</a:t>
+              <a:t>Just to set thing straight…</a:t>
             </a:r>
             <a:endParaRPr lang="en-US" sz="2400" dirty="0">
               <a:solidFill>
@@ -6967,29 +7182,30 @@
           <a:p>
             <a:r>
               <a:rPr lang="en-US" dirty="0" smtClean="0"/>
-              <a:t>A look back at Classic ASP/ASP.NET …</a:t>
-            </a:r>
-          </a:p>
-          <a:p>
-            <a:pPr lvl="1"/>
-            <a:r>
-              <a:rPr lang="en-US" dirty="0" smtClean="0"/>
-              <a:t>1996 – ASP (part of IIS 3.0/Windows NT 4.0 SP2)</a:t>
-            </a:r>
-          </a:p>
-          <a:p>
-            <a:pPr lvl="1"/>
-            <a:r>
-              <a:rPr lang="en-US" dirty="0" smtClean="0"/>
-              <a:t>2002 – ASP.NET (Web Forms) with .NET 1.0</a:t>
-            </a:r>
-          </a:p>
-          <a:p>
-            <a:pPr lvl="1"/>
-            <a:r>
-              <a:rPr lang="en-US" dirty="0" smtClean="0"/>
-              <a:t>2008 – ASP.NET MCVC</a:t>
-            </a:r>
+              <a:t>All demos work with VS 2015 RTM</a:t>
+            </a:r>
+          </a:p>
+          <a:p>
+            <a:r>
+              <a:rPr lang="en-US" dirty="0" smtClean="0"/>
+              <a:t>All demos target Beta 5</a:t>
+            </a:r>
+          </a:p>
+          <a:p>
+            <a:r>
+              <a:rPr lang="en-US" dirty="0" smtClean="0"/>
+              <a:t>Using my own </a:t>
+            </a:r>
+            <a:r>
+              <a:rPr lang="en-US" dirty="0" err="1" smtClean="0"/>
+              <a:t>NuGet</a:t>
+            </a:r>
+            <a:r>
+              <a:rPr lang="en-US" dirty="0" smtClean="0"/>
+              <a:t> gallery feed for demos</a:t>
+            </a:r>
+          </a:p>
+          <a:p>
             <a:endParaRPr lang="en-US" dirty="0"/>
           </a:p>
         </p:txBody>
@@ -7051,7 +7267,7 @@
           <a:p>
             <a:r>
               <a:rPr lang="en-US" dirty="0" smtClean="0"/>
-              <a:t>History</a:t>
+              <a:t>Status Quo</a:t>
             </a:r>
             <a:r>
               <a:rPr lang="en-US" dirty="0" smtClean="0"/>
@@ -7066,7 +7282,7 @@
                   <a:schemeClr val="accent1"/>
                 </a:solidFill>
               </a:rPr>
-              <a:t>Where are we now?</a:t>
+              <a:t>What’s the chase and how do we cut to it?</a:t>
             </a:r>
             <a:endParaRPr lang="en-US" sz="2400" dirty="0">
               <a:solidFill>
@@ -7093,28 +7309,46 @@
           <a:p>
             <a:r>
               <a:rPr lang="en-US" dirty="0" smtClean="0"/>
-              <a:t>A look back at Classic ASP/ASP.NET …</a:t>
-            </a:r>
-          </a:p>
-          <a:p>
-            <a:pPr lvl="1"/>
-            <a:r>
-              <a:rPr lang="en-US" dirty="0" smtClean="0"/>
-              <a:t>2010 – ASP.NET Web Pages</a:t>
-            </a:r>
-          </a:p>
-          <a:p>
-            <a:pPr lvl="1"/>
-            <a:r>
-              <a:rPr lang="en-US" dirty="0" smtClean="0"/>
-              <a:t>2012 – ASP.NET Web API, SignalR</a:t>
-            </a:r>
-          </a:p>
-          <a:p>
-            <a:pPr lvl="1"/>
-            <a:r>
-              <a:rPr lang="en-US" dirty="0" smtClean="0"/>
-              <a:t>2013/2014 – ASP.NET 5</a:t>
+              <a:t>Beta 6 – 27 Jul 2015</a:t>
+            </a:r>
+          </a:p>
+          <a:p>
+            <a:r>
+              <a:rPr lang="en-US" dirty="0" smtClean="0"/>
+              <a:t>Beta 7 – 2 Sep 2015</a:t>
+            </a:r>
+          </a:p>
+          <a:p>
+            <a:r>
+              <a:rPr lang="en-US" dirty="0" smtClean="0"/>
+              <a:t>Beta 8 – 15 Oct 2015</a:t>
+            </a:r>
+          </a:p>
+          <a:p>
+            <a:r>
+              <a:rPr lang="en-US" dirty="0" smtClean="0"/>
+              <a:t>RC 1 – Nov 2015</a:t>
+            </a:r>
+          </a:p>
+          <a:p>
+            <a:r>
+              <a:rPr lang="en-US" dirty="0" smtClean="0"/>
+              <a:t>1.0.0 – Q1* 2015</a:t>
+            </a:r>
+          </a:p>
+          <a:p>
+            <a:endParaRPr lang="en-US" dirty="0"/>
+          </a:p>
+          <a:p>
+            <a:r>
+              <a:rPr lang="en-US" dirty="0" smtClean="0"/>
+              <a:t>* Calendar-based quarters (Q1, Q2, etc.)</a:t>
+            </a:r>
+          </a:p>
+          <a:p>
+            <a:r>
+              <a:rPr lang="en-US" dirty="0"/>
+              <a:t>https://github.com/aspnet/Home/wiki/Roadmap</a:t>
             </a:r>
             <a:endParaRPr lang="en-US" dirty="0"/>
           </a:p>
@@ -7123,7 +7357,7 @@
     </p:spTree>
     <p:extLst>
       <p:ext uri="{BB962C8B-B14F-4D97-AF65-F5344CB8AC3E}">
-        <p14:creationId xmlns:p14="http://schemas.microsoft.com/office/powerpoint/2010/main" val="258123486"/>
+        <p14:creationId xmlns:p14="http://schemas.microsoft.com/office/powerpoint/2010/main" val="1630075605"/>
       </p:ext>
     </p:extLst>
   </p:cSld>
@@ -7177,11 +7411,7 @@
           <a:p>
             <a:r>
               <a:rPr lang="en-US" dirty="0" smtClean="0"/>
-              <a:t>Why?</a:t>
-            </a:r>
-            <a:r>
-              <a:rPr lang="en-US" dirty="0" smtClean="0"/>
-              <a:t/>
+              <a:t>History</a:t>
             </a:r>
             <a:br>
               <a:rPr lang="en-US" dirty="0" smtClean="0"/>
@@ -7192,7 +7422,7 @@
                   <a:schemeClr val="accent1"/>
                 </a:solidFill>
               </a:rPr>
-              <a:t>All this work for …</a:t>
+              <a:t>Where are we now?</a:t>
             </a:r>
             <a:endParaRPr lang="en-US" sz="2400" dirty="0">
               <a:solidFill>
@@ -7219,27 +7449,28 @@
           <a:p>
             <a:r>
               <a:rPr lang="en-US" dirty="0" smtClean="0"/>
-              <a:t>Fast(</a:t>
-            </a:r>
-            <a:r>
-              <a:rPr lang="en-US" dirty="0" err="1" smtClean="0"/>
-              <a:t>er</a:t>
-            </a:r>
-            <a:r>
-              <a:rPr lang="en-US" dirty="0" smtClean="0"/>
-              <a:t>) Development Cycle</a:t>
-            </a:r>
-          </a:p>
-          <a:p>
-            <a:r>
-              <a:rPr lang="en-US" dirty="0" smtClean="0"/>
-              <a:t>Opt-in Approach</a:t>
-            </a:r>
-          </a:p>
-          <a:p>
-            <a:r>
-              <a:rPr lang="en-US" dirty="0" smtClean="0"/>
-              <a:t>Open Source</a:t>
+              <a:t>A look back at Classic ASP/ASP.NET …</a:t>
+            </a:r>
+          </a:p>
+          <a:p>
+            <a:pPr lvl="1"/>
+            <a:r>
+              <a:rPr lang="en-US" dirty="0" smtClean="0"/>
+              <a:t>1996 – ASP (part of IIS 3.0/Windows NT 4.0 SP2)</a:t>
+            </a:r>
+          </a:p>
+          <a:p>
+            <a:pPr lvl="1"/>
+            <a:r>
+              <a:rPr lang="en-US" dirty="0" smtClean="0"/>
+              <a:t>2002 – ASP.NET (Web Forms) with .NET 1.0</a:t>
+            </a:r>
+          </a:p>
+          <a:p>
+            <a:pPr lvl="1"/>
+            <a:r>
+              <a:rPr lang="en-US" dirty="0" smtClean="0"/>
+              <a:t>2008 – ASP.NET MCVC</a:t>
             </a:r>
             <a:endParaRPr lang="en-US" dirty="0"/>
           </a:p>
@@ -7248,7 +7479,7 @@
     </p:spTree>
     <p:extLst>
       <p:ext uri="{BB962C8B-B14F-4D97-AF65-F5344CB8AC3E}">
-        <p14:creationId xmlns:p14="http://schemas.microsoft.com/office/powerpoint/2010/main" val="419956014"/>
+        <p14:creationId xmlns:p14="http://schemas.microsoft.com/office/powerpoint/2010/main" val="3594183005"/>
       </p:ext>
     </p:extLst>
   </p:cSld>
@@ -7302,11 +7533,7 @@
           <a:p>
             <a:r>
               <a:rPr lang="en-US" dirty="0" smtClean="0"/>
-              <a:t>Why?</a:t>
-            </a:r>
-            <a:r>
-              <a:rPr lang="en-US" dirty="0" smtClean="0"/>
-              <a:t/>
+              <a:t>History</a:t>
             </a:r>
             <a:br>
               <a:rPr lang="en-US" dirty="0" smtClean="0"/>
@@ -7317,7 +7544,7 @@
                   <a:schemeClr val="accent1"/>
                 </a:solidFill>
               </a:rPr>
-              <a:t>All this work for …</a:t>
+              <a:t>Where are we now?</a:t>
             </a:r>
             <a:endParaRPr lang="en-US" sz="2400" dirty="0">
               <a:solidFill>
@@ -7344,27 +7571,28 @@
           <a:p>
             <a:r>
               <a:rPr lang="en-US" dirty="0" smtClean="0"/>
-              <a:t>Cross Platform</a:t>
-            </a:r>
-          </a:p>
-          <a:p>
-            <a:r>
-              <a:rPr lang="en-US" dirty="0" smtClean="0"/>
-              <a:t>On-</a:t>
-            </a:r>
-            <a:r>
-              <a:rPr lang="en-US" dirty="0" err="1" smtClean="0"/>
-              <a:t>prem</a:t>
-            </a:r>
-            <a:r>
-              <a:rPr lang="en-US" dirty="0" smtClean="0"/>
-              <a:t> to Cloud</a:t>
-            </a:r>
-          </a:p>
-          <a:p>
-            <a:r>
-              <a:rPr lang="en-US" dirty="0" smtClean="0"/>
-              <a:t>Development Experience</a:t>
+              <a:t>A look back at Classic ASP/ASP.NET …</a:t>
+            </a:r>
+          </a:p>
+          <a:p>
+            <a:pPr lvl="1"/>
+            <a:r>
+              <a:rPr lang="en-US" dirty="0" smtClean="0"/>
+              <a:t>2010 – ASP.NET Web Pages</a:t>
+            </a:r>
+          </a:p>
+          <a:p>
+            <a:pPr lvl="1"/>
+            <a:r>
+              <a:rPr lang="en-US" dirty="0" smtClean="0"/>
+              <a:t>2012 – ASP.NET Web API, SignalR</a:t>
+            </a:r>
+          </a:p>
+          <a:p>
+            <a:pPr lvl="1"/>
+            <a:r>
+              <a:rPr lang="en-US" dirty="0" smtClean="0"/>
+              <a:t>2013/2014 – ASP.NET 5</a:t>
             </a:r>
             <a:endParaRPr lang="en-US" dirty="0"/>
           </a:p>
@@ -7373,7 +7601,7 @@
     </p:spTree>
     <p:extLst>
       <p:ext uri="{BB962C8B-B14F-4D97-AF65-F5344CB8AC3E}">
-        <p14:creationId xmlns:p14="http://schemas.microsoft.com/office/powerpoint/2010/main" val="2397425477"/>
+        <p14:creationId xmlns:p14="http://schemas.microsoft.com/office/powerpoint/2010/main" val="258123486"/>
       </p:ext>
     </p:extLst>
   </p:cSld>
@@ -7427,19 +7655,19 @@
           <a:p>
             <a:r>
               <a:rPr lang="en-US" dirty="0" smtClean="0"/>
-              <a:t>Fast(</a:t>
-            </a:r>
-            <a:r>
-              <a:rPr lang="en-US" dirty="0" err="1" smtClean="0"/>
-              <a:t>er</a:t>
-            </a:r>
-            <a:r>
-              <a:rPr lang="en-US" dirty="0" smtClean="0"/>
-              <a:t>) Development Cycle</a:t>
+              <a:t>Why?</a:t>
             </a:r>
             <a:br>
               <a:rPr lang="en-US" dirty="0" smtClean="0"/>
             </a:br>
+            <a:r>
+              <a:rPr lang="en-US" sz="2400" dirty="0" smtClean="0">
+                <a:solidFill>
+                  <a:schemeClr val="accent1"/>
+                </a:solidFill>
+              </a:rPr>
+              <a:t>All this work for …</a:t>
+            </a:r>
             <a:endParaRPr lang="en-US" sz="2400" dirty="0">
               <a:solidFill>
                 <a:schemeClr val="accent1"/>
@@ -7464,57 +7692,28 @@
           <a:lstStyle/>
           <a:p>
             <a:r>
-              <a:rPr lang="en-US" dirty="0"/>
-              <a:t>Framework ships with application</a:t>
-            </a:r>
-          </a:p>
-          <a:p>
-            <a:pPr lvl="1"/>
-            <a:r>
-              <a:rPr lang="en-US" dirty="0"/>
-              <a:t>Similar to mobile applications</a:t>
-            </a:r>
-          </a:p>
-          <a:p>
-            <a:r>
-              <a:rPr lang="en-US" dirty="0"/>
-              <a:t>2 Framework Versions</a:t>
-            </a:r>
-          </a:p>
-          <a:p>
-            <a:pPr lvl="1"/>
-            <a:r>
-              <a:rPr lang="en-US" dirty="0"/>
-              <a:t>.NET </a:t>
-            </a:r>
-            <a:r>
-              <a:rPr lang="en-US" dirty="0" err="1"/>
-              <a:t>vNext</a:t>
-            </a:r>
-            <a:r>
-              <a:rPr lang="en-US" dirty="0"/>
-              <a:t> – full</a:t>
-            </a:r>
-          </a:p>
-          <a:p>
-            <a:pPr lvl="1"/>
-            <a:r>
-              <a:rPr lang="en-US" dirty="0"/>
-              <a:t>.NET </a:t>
-            </a:r>
-            <a:r>
-              <a:rPr lang="en-US" dirty="0" smtClean="0"/>
-              <a:t>Core </a:t>
-            </a:r>
-            <a:r>
-              <a:rPr lang="en-US" dirty="0"/>
-              <a:t>– lighter</a:t>
-            </a:r>
-          </a:p>
-          <a:p>
-            <a:r>
-              <a:rPr lang="en-US" dirty="0"/>
-              <a:t>Break dependency on VS/Core schedules</a:t>
+              <a:rPr lang="en-US" dirty="0" smtClean="0"/>
+              <a:t>Fast(</a:t>
+            </a:r>
+            <a:r>
+              <a:rPr lang="en-US" dirty="0" err="1" smtClean="0"/>
+              <a:t>er</a:t>
+            </a:r>
+            <a:r>
+              <a:rPr lang="en-US" dirty="0" smtClean="0"/>
+              <a:t>) Development Cycle</a:t>
+            </a:r>
+          </a:p>
+          <a:p>
+            <a:r>
+              <a:rPr lang="en-US" dirty="0" smtClean="0"/>
+              <a:t>Opt-in Approach</a:t>
+            </a:r>
+          </a:p>
+          <a:p>
+            <a:r>
+              <a:rPr lang="en-US" dirty="0" smtClean="0"/>
+              <a:t>Open Source</a:t>
             </a:r>
             <a:endParaRPr lang="en-US" dirty="0"/>
           </a:p>
@@ -7523,7 +7722,7 @@
     </p:spTree>
     <p:extLst>
       <p:ext uri="{BB962C8B-B14F-4D97-AF65-F5344CB8AC3E}">
-        <p14:creationId xmlns:p14="http://schemas.microsoft.com/office/powerpoint/2010/main" val="3652661958"/>
+        <p14:creationId xmlns:p14="http://schemas.microsoft.com/office/powerpoint/2010/main" val="419956014"/>
       </p:ext>
     </p:extLst>
   </p:cSld>
@@ -8887,12 +9086,6 @@
 </file>
 
 <file path=customXml/item1.xml><?xml version="1.0" encoding="utf-8"?>
-<p:properties xmlns:p="http://schemas.microsoft.com/office/2006/metadata/properties" xmlns:xsi="http://www.w3.org/2001/XMLSchema-instance">
-  <documentManagement/>
-</p:properties>
-</file>
-
-<file path=customXml/item2.xml><?xml version="1.0" encoding="utf-8"?>
 <ct:contentTypeSchema xmlns:ct="http://schemas.microsoft.com/office/2006/metadata/contentType" xmlns:ma="http://schemas.microsoft.com/office/2006/metadata/properties/metaAttributes" ct:_="" ma:_="" ma:contentTypeName="Document" ma:contentTypeID="0x0101003865B9DCC8F7FB4A82840FBDE1FC983A" ma:contentTypeVersion="0" ma:contentTypeDescription="Create a new document." ma:contentTypeScope="" ma:versionID="ecd0916681f32cda70880b341f4a8911">
   <xsd:schema xmlns:xsd="http://www.w3.org/2001/XMLSchema" xmlns:p="http://schemas.microsoft.com/office/2006/metadata/properties" targetNamespace="http://schemas.microsoft.com/office/2006/metadata/properties" ma:root="true" ma:fieldsID="4aeb20c0e3442673af7ee10786458764">
     <xsd:element name="properties">
@@ -8941,6 +9134,12 @@
 </ct:contentTypeSchema>
 </file>
 
+<file path=customXml/item2.xml><?xml version="1.0" encoding="utf-8"?>
+<p:properties xmlns:p="http://schemas.microsoft.com/office/2006/metadata/properties" xmlns:xsi="http://www.w3.org/2001/XMLSchema-instance">
+  <documentManagement/>
+</p:properties>
+</file>
+
 <file path=customXml/item3.xml><?xml version="1.0" encoding="utf-8"?>
 <?mso-contentType ?>
 <FormTemplates xmlns="http://schemas.microsoft.com/sharepoint/v3/contenttype/forms">
@@ -8951,20 +9150,6 @@
 </file>
 
 <file path=customXml/itemProps1.xml><?xml version="1.0" encoding="utf-8"?>
-<ds:datastoreItem xmlns:ds="http://schemas.openxmlformats.org/officeDocument/2006/customXml" ds:itemID="{2D498799-B0FC-4B7A-8396-BFC34D805990}">
-  <ds:schemaRefs>
-    <ds:schemaRef ds:uri="http://purl.org/dc/dcmitype/"/>
-    <ds:schemaRef ds:uri="http://purl.org/dc/elements/1.1/"/>
-    <ds:schemaRef ds:uri="http://purl.org/dc/terms/"/>
-    <ds:schemaRef ds:uri="http://schemas.openxmlformats.org/package/2006/metadata/core-properties"/>
-    <ds:schemaRef ds:uri="http://schemas.microsoft.com/office/2006/documentManagement/types"/>
-    <ds:schemaRef ds:uri="http://www.w3.org/XML/1998/namespace"/>
-    <ds:schemaRef ds:uri="http://schemas.microsoft.com/office/2006/metadata/properties"/>
-  </ds:schemaRefs>
-</ds:datastoreItem>
-</file>
-
-<file path=customXml/itemProps2.xml><?xml version="1.0" encoding="utf-8"?>
 <ds:datastoreItem xmlns:ds="http://schemas.openxmlformats.org/officeDocument/2006/customXml" ds:itemID="{1DEB1AF8-B785-4B22-89EC-168618F34A5B}">
   <ds:schemaRefs>
     <ds:schemaRef ds:uri="http://schemas.microsoft.com/office/2006/metadata/contentType"/>
@@ -8979,6 +9164,20 @@
 </ds:datastoreItem>
 </file>
 
+<file path=customXml/itemProps2.xml><?xml version="1.0" encoding="utf-8"?>
+<ds:datastoreItem xmlns:ds="http://schemas.openxmlformats.org/officeDocument/2006/customXml" ds:itemID="{2D498799-B0FC-4B7A-8396-BFC34D805990}">
+  <ds:schemaRefs>
+    <ds:schemaRef ds:uri="http://purl.org/dc/dcmitype/"/>
+    <ds:schemaRef ds:uri="http://purl.org/dc/elements/1.1/"/>
+    <ds:schemaRef ds:uri="http://purl.org/dc/terms/"/>
+    <ds:schemaRef ds:uri="http://schemas.openxmlformats.org/package/2006/metadata/core-properties"/>
+    <ds:schemaRef ds:uri="http://schemas.microsoft.com/office/2006/documentManagement/types"/>
+    <ds:schemaRef ds:uri="http://www.w3.org/XML/1998/namespace"/>
+    <ds:schemaRef ds:uri="http://schemas.microsoft.com/office/2006/metadata/properties"/>
+  </ds:schemaRefs>
+</ds:datastoreItem>
+</file>
+
 <file path=customXml/itemProps3.xml><?xml version="1.0" encoding="utf-8"?>
 <ds:datastoreItem xmlns:ds="http://schemas.openxmlformats.org/officeDocument/2006/customXml" ds:itemID="{1685463B-57CE-4CE4-B1CF-FE44EB79BFA3}">
   <ds:schemaRefs>

</xml_diff>